<commit_message>
Adicionando vesão 2 no PETCH
</commit_message>
<xml_diff>
--- a/PastaDocumentos/Pitch.pptx
+++ b/PastaDocumentos/Pitch.pptx
@@ -104,6 +104,11 @@
       </a:defRPr>
     </a:lvl9pPr>
   </p:defaultTextStyle>
+  <p:extLst>
+    <p:ext uri="{EFAFB233-063F-42B5-8137-9DF3F51BA10A}">
+      <p15:sldGuideLst xmlns:p15="http://schemas.microsoft.com/office/powerpoint/2012/main"/>
+    </p:ext>
+  </p:extLst>
 </p:presentation>
 </file>
 
@@ -3382,6 +3387,20 @@
               <a:rPr lang="pt-BR" dirty="0" err="1"/>
               <a:t>Git</a:t>
             </a:r>
+            <a:r>
+              <a:rPr lang="pt-BR" dirty="0"/>
+              <a:t> </a:t>
+            </a:r>
+          </a:p>
+          <a:p>
+            <a:r>
+              <a:rPr lang="pt-BR" dirty="0"/>
+              <a:t>2 </a:t>
+            </a:r>
+            <a:r>
+              <a:rPr lang="pt-BR"/>
+              <a:t>Version</a:t>
+            </a:r>
             <a:endParaRPr lang="en-US" dirty="0"/>
           </a:p>
         </p:txBody>

</xml_diff>